<commit_message>
Add slide with other tools.
</commit_message>
<xml_diff>
--- a/Resources/Documentation/Presentation.pptx
+++ b/Resources/Documentation/Presentation.pptx
@@ -19,11 +19,12 @@
     <p:sldId id="269" r:id="rId13"/>
     <p:sldId id="271" r:id="rId14"/>
     <p:sldId id="272" r:id="rId15"/>
-    <p:sldId id="273" r:id="rId16"/>
-    <p:sldId id="276" r:id="rId17"/>
-    <p:sldId id="274" r:id="rId18"/>
-    <p:sldId id="275" r:id="rId19"/>
-    <p:sldId id="277" r:id="rId20"/>
+    <p:sldId id="278" r:id="rId16"/>
+    <p:sldId id="273" r:id="rId17"/>
+    <p:sldId id="276" r:id="rId18"/>
+    <p:sldId id="274" r:id="rId19"/>
+    <p:sldId id="275" r:id="rId20"/>
+    <p:sldId id="277" r:id="rId21"/>
   </p:sldIdLst>
   <p:sldSz cx="12192000" cy="6858000"/>
   <p:notesSz cx="6858000" cy="9144000"/>
@@ -122,6 +123,11 @@
       </a:defRPr>
     </a:lvl9pPr>
   </p:defaultTextStyle>
+  <p:extLst>
+    <p:ext uri="{EFAFB233-063F-42B5-8137-9DF3F51BA10A}">
+      <p15:sldGuideLst xmlns:p15="http://schemas.microsoft.com/office/powerpoint/2012/main"/>
+    </p:ext>
+  </p:extLst>
 </p:presentation>
 </file>
 
@@ -272,7 +278,7 @@
           <a:p>
             <a:fld id="{03DEA52E-11A4-4484-AF76-58D9B1A10A97}" type="datetimeFigureOut">
               <a:rPr lang="en-US" smtClean="0"/>
-              <a:t>6/7/2018</a:t>
+              <a:t>6/8/2018</a:t>
             </a:fld>
             <a:endParaRPr lang="en-US"/>
           </a:p>
@@ -470,7 +476,7 @@
           <a:p>
             <a:fld id="{03DEA52E-11A4-4484-AF76-58D9B1A10A97}" type="datetimeFigureOut">
               <a:rPr lang="en-US" smtClean="0"/>
-              <a:t>6/7/2018</a:t>
+              <a:t>6/8/2018</a:t>
             </a:fld>
             <a:endParaRPr lang="en-US"/>
           </a:p>
@@ -678,7 +684,7 @@
           <a:p>
             <a:fld id="{03DEA52E-11A4-4484-AF76-58D9B1A10A97}" type="datetimeFigureOut">
               <a:rPr lang="en-US" smtClean="0"/>
-              <a:t>6/7/2018</a:t>
+              <a:t>6/8/2018</a:t>
             </a:fld>
             <a:endParaRPr lang="en-US"/>
           </a:p>
@@ -876,7 +882,7 @@
           <a:p>
             <a:fld id="{03DEA52E-11A4-4484-AF76-58D9B1A10A97}" type="datetimeFigureOut">
               <a:rPr lang="en-US" smtClean="0"/>
-              <a:t>6/7/2018</a:t>
+              <a:t>6/8/2018</a:t>
             </a:fld>
             <a:endParaRPr lang="en-US"/>
           </a:p>
@@ -1151,7 +1157,7 @@
           <a:p>
             <a:fld id="{03DEA52E-11A4-4484-AF76-58D9B1A10A97}" type="datetimeFigureOut">
               <a:rPr lang="en-US" smtClean="0"/>
-              <a:t>6/7/2018</a:t>
+              <a:t>6/8/2018</a:t>
             </a:fld>
             <a:endParaRPr lang="en-US"/>
           </a:p>
@@ -1416,7 +1422,7 @@
           <a:p>
             <a:fld id="{03DEA52E-11A4-4484-AF76-58D9B1A10A97}" type="datetimeFigureOut">
               <a:rPr lang="en-US" smtClean="0"/>
-              <a:t>6/7/2018</a:t>
+              <a:t>6/8/2018</a:t>
             </a:fld>
             <a:endParaRPr lang="en-US"/>
           </a:p>
@@ -1828,7 +1834,7 @@
           <a:p>
             <a:fld id="{03DEA52E-11A4-4484-AF76-58D9B1A10A97}" type="datetimeFigureOut">
               <a:rPr lang="en-US" smtClean="0"/>
-              <a:t>6/7/2018</a:t>
+              <a:t>6/8/2018</a:t>
             </a:fld>
             <a:endParaRPr lang="en-US"/>
           </a:p>
@@ -1969,7 +1975,7 @@
           <a:p>
             <a:fld id="{03DEA52E-11A4-4484-AF76-58D9B1A10A97}" type="datetimeFigureOut">
               <a:rPr lang="en-US" smtClean="0"/>
-              <a:t>6/7/2018</a:t>
+              <a:t>6/8/2018</a:t>
             </a:fld>
             <a:endParaRPr lang="en-US"/>
           </a:p>
@@ -2082,7 +2088,7 @@
           <a:p>
             <a:fld id="{03DEA52E-11A4-4484-AF76-58D9B1A10A97}" type="datetimeFigureOut">
               <a:rPr lang="en-US" smtClean="0"/>
-              <a:t>6/7/2018</a:t>
+              <a:t>6/8/2018</a:t>
             </a:fld>
             <a:endParaRPr lang="en-US"/>
           </a:p>
@@ -2393,7 +2399,7 @@
           <a:p>
             <a:fld id="{03DEA52E-11A4-4484-AF76-58D9B1A10A97}" type="datetimeFigureOut">
               <a:rPr lang="en-US" smtClean="0"/>
-              <a:t>6/7/2018</a:t>
+              <a:t>6/8/2018</a:t>
             </a:fld>
             <a:endParaRPr lang="en-US"/>
           </a:p>
@@ -2681,7 +2687,7 @@
           <a:p>
             <a:fld id="{03DEA52E-11A4-4484-AF76-58D9B1A10A97}" type="datetimeFigureOut">
               <a:rPr lang="en-US" smtClean="0"/>
-              <a:t>6/7/2018</a:t>
+              <a:t>6/8/2018</a:t>
             </a:fld>
             <a:endParaRPr lang="en-US"/>
           </a:p>
@@ -2922,7 +2928,7 @@
           <a:p>
             <a:fld id="{03DEA52E-11A4-4484-AF76-58D9B1A10A97}" type="datetimeFigureOut">
               <a:rPr lang="en-US" smtClean="0"/>
-              <a:t>6/7/2018</a:t>
+              <a:t>6/8/2018</a:t>
             </a:fld>
             <a:endParaRPr lang="en-US"/>
           </a:p>
@@ -4406,7 +4412,7 @@
                 <a:latin typeface="Segoe UI Light" panose="020B0502040204020203" pitchFamily="34" charset="0"/>
                 <a:cs typeface="Segoe UI Light" panose="020B0502040204020203" pitchFamily="34" charset="0"/>
               </a:rPr>
-              <a:t>Learned Lessons</a:t>
+              <a:t>Team organization</a:t>
             </a:r>
           </a:p>
         </p:txBody>
@@ -4452,7 +4458,7 @@
                 <a:latin typeface="Segoe UI Light" panose="020B0502040204020203" pitchFamily="34" charset="0"/>
                 <a:cs typeface="Segoe UI Light" panose="020B0502040204020203" pitchFamily="34" charset="0"/>
               </a:rPr>
-              <a:t>Communication</a:t>
+              <a:t>Other Tools</a:t>
             </a:r>
           </a:p>
         </p:txBody>
@@ -4460,7 +4466,7 @@
     </p:spTree>
     <p:extLst>
       <p:ext uri="{BB962C8B-B14F-4D97-AF65-F5344CB8AC3E}">
-        <p14:creationId xmlns:p14="http://schemas.microsoft.com/office/powerpoint/2010/main" val="510906058"/>
+        <p14:creationId xmlns:p14="http://schemas.microsoft.com/office/powerpoint/2010/main" val="1973141436"/>
       </p:ext>
     </p:extLst>
   </p:cSld>
@@ -4578,7 +4584,7 @@
                 <a:latin typeface="Segoe UI Light" panose="020B0502040204020203" pitchFamily="34" charset="0"/>
                 <a:cs typeface="Segoe UI Light" panose="020B0502040204020203" pitchFamily="34" charset="0"/>
               </a:rPr>
-              <a:t>Time Management</a:t>
+              <a:t>Communication</a:t>
             </a:r>
           </a:p>
         </p:txBody>
@@ -4586,7 +4592,7 @@
     </p:spTree>
     <p:extLst>
       <p:ext uri="{BB962C8B-B14F-4D97-AF65-F5344CB8AC3E}">
-        <p14:creationId xmlns:p14="http://schemas.microsoft.com/office/powerpoint/2010/main" val="2929311001"/>
+        <p14:creationId xmlns:p14="http://schemas.microsoft.com/office/powerpoint/2010/main" val="510906058"/>
       </p:ext>
     </p:extLst>
   </p:cSld>
@@ -4658,7 +4664,7 @@
                 <a:latin typeface="Segoe UI Light" panose="020B0502040204020203" pitchFamily="34" charset="0"/>
                 <a:cs typeface="Segoe UI Light" panose="020B0502040204020203" pitchFamily="34" charset="0"/>
               </a:rPr>
-              <a:t>Improvements Proposals</a:t>
+              <a:t>Learned Lessons</a:t>
             </a:r>
           </a:p>
         </p:txBody>
@@ -4704,7 +4710,7 @@
                 <a:latin typeface="Segoe UI Light" panose="020B0502040204020203" pitchFamily="34" charset="0"/>
                 <a:cs typeface="Segoe UI Light" panose="020B0502040204020203" pitchFamily="34" charset="0"/>
               </a:rPr>
-              <a:t>Application</a:t>
+              <a:t>Time Management</a:t>
             </a:r>
           </a:p>
         </p:txBody>
@@ -4712,7 +4718,7 @@
     </p:spTree>
     <p:extLst>
       <p:ext uri="{BB962C8B-B14F-4D97-AF65-F5344CB8AC3E}">
-        <p14:creationId xmlns:p14="http://schemas.microsoft.com/office/powerpoint/2010/main" val="3311711618"/>
+        <p14:creationId xmlns:p14="http://schemas.microsoft.com/office/powerpoint/2010/main" val="2929311001"/>
       </p:ext>
     </p:extLst>
   </p:cSld>
@@ -4830,7 +4836,7 @@
                 <a:latin typeface="Segoe UI Light" panose="020B0502040204020203" pitchFamily="34" charset="0"/>
                 <a:cs typeface="Segoe UI Light" panose="020B0502040204020203" pitchFamily="34" charset="0"/>
               </a:rPr>
-              <a:t>Laboratory</a:t>
+              <a:t>Application</a:t>
             </a:r>
           </a:p>
         </p:txBody>
@@ -4838,7 +4844,7 @@
     </p:spTree>
     <p:extLst>
       <p:ext uri="{BB962C8B-B14F-4D97-AF65-F5344CB8AC3E}">
-        <p14:creationId xmlns:p14="http://schemas.microsoft.com/office/powerpoint/2010/main" val="1203104897"/>
+        <p14:creationId xmlns:p14="http://schemas.microsoft.com/office/powerpoint/2010/main" val="3311711618"/>
       </p:ext>
     </p:extLst>
   </p:cSld>
@@ -4875,10 +4881,10 @@
       </p:grpSpPr>
       <p:sp>
         <p:nvSpPr>
-          <p:cNvPr id="2" name="TextBox 1">
-            <a:extLst>
-              <a:ext uri="{FF2B5EF4-FFF2-40B4-BE49-F238E27FC236}">
-                <a16:creationId xmlns:a16="http://schemas.microsoft.com/office/drawing/2014/main" id="{03AE5029-EA12-471F-AD56-AF538E54D190}"/>
+          <p:cNvPr id="12" name="TextBox 11">
+            <a:extLst>
+              <a:ext uri="{FF2B5EF4-FFF2-40B4-BE49-F238E27FC236}">
+                <a16:creationId xmlns:a16="http://schemas.microsoft.com/office/drawing/2014/main" id="{C7A01162-F3B7-439A-8AB5-F2EA0BFACEA1}"/>
               </a:ext>
             </a:extLst>
           </p:cNvPr>
@@ -4887,8 +4893,8 @@
         </p:nvSpPr>
         <p:spPr>
           <a:xfrm>
-            <a:off x="0" y="2828835"/>
-            <a:ext cx="12191999" cy="1200329"/>
+            <a:off x="0" y="244345"/>
+            <a:ext cx="12191999" cy="538609"/>
           </a:xfrm>
           <a:prstGeom prst="rect">
             <a:avLst/>
@@ -4901,20 +4907,62 @@
           </a:bodyPr>
           <a:lstStyle/>
           <a:p>
+            <a:pPr algn="ctr"/>
+            <a:r>
+              <a:rPr lang="en-US" sz="2900" dirty="0">
+                <a:solidFill>
+                  <a:srgbClr val="D61F3C"/>
+                </a:solidFill>
+                <a:latin typeface="Segoe UI Light" panose="020B0502040204020203" pitchFamily="34" charset="0"/>
+                <a:cs typeface="Segoe UI Light" panose="020B0502040204020203" pitchFamily="34" charset="0"/>
+              </a:rPr>
+              <a:t>Improvements Proposals</a:t>
+            </a:r>
+          </a:p>
+        </p:txBody>
+      </p:sp>
+      <p:sp>
+        <p:nvSpPr>
+          <p:cNvPr id="2" name="TextBox 1">
+            <a:extLst>
+              <a:ext uri="{FF2B5EF4-FFF2-40B4-BE49-F238E27FC236}">
+                <a16:creationId xmlns:a16="http://schemas.microsoft.com/office/drawing/2014/main" id="{03AE5029-EA12-471F-AD56-AF538E54D190}"/>
+              </a:ext>
+            </a:extLst>
+          </p:cNvPr>
+          <p:cNvSpPr txBox="1"/>
+          <p:nvPr/>
+        </p:nvSpPr>
+        <p:spPr>
+          <a:xfrm>
+            <a:off x="-1" y="3044279"/>
+            <a:ext cx="12191999" cy="769441"/>
+          </a:xfrm>
+          <a:prstGeom prst="rect">
+            <a:avLst/>
+          </a:prstGeom>
+          <a:noFill/>
+        </p:spPr>
+        <p:txBody>
+          <a:bodyPr wrap="square" rtlCol="0">
+            <a:spAutoFit/>
+          </a:bodyPr>
+          <a:lstStyle/>
+          <a:p>
             <a:pPr algn="ctr">
               <a:spcAft>
                 <a:spcPts val="1200"/>
               </a:spcAft>
             </a:pPr>
             <a:r>
-              <a:rPr lang="en-US" sz="7200" dirty="0">
+              <a:rPr lang="en-US" sz="4400" dirty="0">
                 <a:solidFill>
                   <a:srgbClr val="454649"/>
                 </a:solidFill>
                 <a:latin typeface="Segoe UI Light" panose="020B0502040204020203" pitchFamily="34" charset="0"/>
                 <a:cs typeface="Segoe UI Light" panose="020B0502040204020203" pitchFamily="34" charset="0"/>
               </a:rPr>
-              <a:t>Demo</a:t>
+              <a:t>Laboratory</a:t>
             </a:r>
           </a:p>
         </p:txBody>
@@ -4922,7 +4970,7 @@
     </p:spTree>
     <p:extLst>
       <p:ext uri="{BB962C8B-B14F-4D97-AF65-F5344CB8AC3E}">
-        <p14:creationId xmlns:p14="http://schemas.microsoft.com/office/powerpoint/2010/main" val="508445989"/>
+        <p14:creationId xmlns:p14="http://schemas.microsoft.com/office/powerpoint/2010/main" val="1203104897"/>
       </p:ext>
     </p:extLst>
   </p:cSld>
@@ -5082,6 +5130,90 @@
     <p:extLst>
       <p:ext uri="{BB962C8B-B14F-4D97-AF65-F5344CB8AC3E}">
         <p14:creationId xmlns:p14="http://schemas.microsoft.com/office/powerpoint/2010/main" val="1756781749"/>
+      </p:ext>
+    </p:extLst>
+  </p:cSld>
+  <p:clrMapOvr>
+    <a:masterClrMapping/>
+  </p:clrMapOvr>
+</p:sld>
+</file>
+
+<file path=ppt/slides/slide20.xml><?xml version="1.0" encoding="utf-8"?>
+<p:sld xmlns:a="http://schemas.openxmlformats.org/drawingml/2006/main" xmlns:r="http://schemas.openxmlformats.org/officeDocument/2006/relationships" xmlns:p="http://schemas.openxmlformats.org/presentationml/2006/main">
+  <p:cSld>
+    <p:bg>
+      <p:bgPr>
+        <a:solidFill>
+          <a:srgbClr val="141518"/>
+        </a:solidFill>
+        <a:effectLst/>
+      </p:bgPr>
+    </p:bg>
+    <p:spTree>
+      <p:nvGrpSpPr>
+        <p:cNvPr id="1" name=""/>
+        <p:cNvGrpSpPr/>
+        <p:nvPr/>
+      </p:nvGrpSpPr>
+      <p:grpSpPr>
+        <a:xfrm>
+          <a:off x="0" y="0"/>
+          <a:ext cx="0" cy="0"/>
+          <a:chOff x="0" y="0"/>
+          <a:chExt cx="0" cy="0"/>
+        </a:xfrm>
+      </p:grpSpPr>
+      <p:sp>
+        <p:nvSpPr>
+          <p:cNvPr id="2" name="TextBox 1">
+            <a:extLst>
+              <a:ext uri="{FF2B5EF4-FFF2-40B4-BE49-F238E27FC236}">
+                <a16:creationId xmlns:a16="http://schemas.microsoft.com/office/drawing/2014/main" id="{03AE5029-EA12-471F-AD56-AF538E54D190}"/>
+              </a:ext>
+            </a:extLst>
+          </p:cNvPr>
+          <p:cNvSpPr txBox="1"/>
+          <p:nvPr/>
+        </p:nvSpPr>
+        <p:spPr>
+          <a:xfrm>
+            <a:off x="0" y="2828835"/>
+            <a:ext cx="12191999" cy="1200329"/>
+          </a:xfrm>
+          <a:prstGeom prst="rect">
+            <a:avLst/>
+          </a:prstGeom>
+          <a:noFill/>
+        </p:spPr>
+        <p:txBody>
+          <a:bodyPr wrap="square" rtlCol="0">
+            <a:spAutoFit/>
+          </a:bodyPr>
+          <a:lstStyle/>
+          <a:p>
+            <a:pPr algn="ctr">
+              <a:spcAft>
+                <a:spcPts val="1200"/>
+              </a:spcAft>
+            </a:pPr>
+            <a:r>
+              <a:rPr lang="en-US" sz="7200" dirty="0">
+                <a:solidFill>
+                  <a:srgbClr val="454649"/>
+                </a:solidFill>
+                <a:latin typeface="Segoe UI Light" panose="020B0502040204020203" pitchFamily="34" charset="0"/>
+                <a:cs typeface="Segoe UI Light" panose="020B0502040204020203" pitchFamily="34" charset="0"/>
+              </a:rPr>
+              <a:t>Demo</a:t>
+            </a:r>
+          </a:p>
+        </p:txBody>
+      </p:sp>
+    </p:spTree>
+    <p:extLst>
+      <p:ext uri="{BB962C8B-B14F-4D97-AF65-F5344CB8AC3E}">
+        <p14:creationId xmlns:p14="http://schemas.microsoft.com/office/powerpoint/2010/main" val="508445989"/>
       </p:ext>
     </p:extLst>
   </p:cSld>

</xml_diff>